<commit_message>
Updated age groups plot
</commit_message>
<xml_diff>
--- a/bin/survival lecture 1.pptx
+++ b/bin/survival lecture 1.pptx
@@ -5,10 +5,10 @@
     <p:sldMasterId id="2147483664" r:id="rId1"/>
   </p:sldMasterIdLst>
   <p:notesMasterIdLst>
-    <p:notesMasterId r:id="rId41"/>
+    <p:notesMasterId r:id="rId47"/>
   </p:notesMasterIdLst>
   <p:handoutMasterIdLst>
-    <p:handoutMasterId r:id="rId42"/>
+    <p:handoutMasterId r:id="rId48"/>
   </p:handoutMasterIdLst>
   <p:sldIdLst>
     <p:sldId id="256" r:id="rId2"/>
@@ -38,10 +38,10 @@
     <p:sldId id="285" r:id="rId26"/>
     <p:sldId id="295" r:id="rId27"/>
     <p:sldId id="294" r:id="rId28"/>
-    <p:sldId id="293" r:id="rId29"/>
-    <p:sldId id="297" r:id="rId30"/>
-    <p:sldId id="296" r:id="rId31"/>
-    <p:sldId id="298" r:id="rId32"/>
+    <p:sldId id="297" r:id="rId29"/>
+    <p:sldId id="293" r:id="rId30"/>
+    <p:sldId id="298" r:id="rId31"/>
+    <p:sldId id="296" r:id="rId32"/>
     <p:sldId id="292" r:id="rId33"/>
     <p:sldId id="291" r:id="rId34"/>
     <p:sldId id="299" r:id="rId35"/>
@@ -50,6 +50,12 @@
     <p:sldId id="288" r:id="rId38"/>
     <p:sldId id="301" r:id="rId39"/>
     <p:sldId id="300" r:id="rId40"/>
+    <p:sldId id="302" r:id="rId41"/>
+    <p:sldId id="306" r:id="rId42"/>
+    <p:sldId id="307" r:id="rId43"/>
+    <p:sldId id="304" r:id="rId44"/>
+    <p:sldId id="305" r:id="rId45"/>
+    <p:sldId id="303" r:id="rId46"/>
   </p:sldIdLst>
   <p:sldSz cx="9144000" cy="6858000" type="screen4x3"/>
   <p:notesSz cx="9601200" cy="7315200"/>
@@ -366,7 +372,7 @@
               <a:pPr>
                 <a:defRPr/>
               </a:pPr>
-              <a:t>4/7/2018</a:t>
+              <a:t>4/8/2018</a:t>
             </a:fld>
             <a:endParaRPr lang="en-US" altLang="en-US"/>
           </a:p>
@@ -674,7 +680,7 @@
               <a:pPr>
                 <a:defRPr/>
               </a:pPr>
-              <a:t>4/7/2018</a:t>
+              <a:t>4/8/2018</a:t>
             </a:fld>
             <a:endParaRPr lang="en-US" altLang="en-US"/>
           </a:p>
@@ -8185,25 +8191,6 @@
       </p:sp>
       <p:sp>
         <p:nvSpPr>
-          <p:cNvPr id="3" name="Text Placeholder 2"/>
-          <p:cNvSpPr>
-            <a:spLocks noGrp="1"/>
-          </p:cNvSpPr>
-          <p:nvPr>
-            <p:ph type="body" idx="1"/>
-          </p:nvPr>
-        </p:nvSpPr>
-        <p:spPr/>
-        <p:txBody>
-          <a:bodyPr/>
-          <a:lstStyle/>
-          <a:p>
-            <a:endParaRPr lang="en-US" dirty="0"/>
-          </a:p>
-        </p:txBody>
-      </p:sp>
-      <p:sp>
-        <p:nvSpPr>
           <p:cNvPr id="4" name="Footer Placeholder 3"/>
           <p:cNvSpPr>
             <a:spLocks noGrp="1"/>
@@ -8265,6 +8252,257 @@
                 <a:defRPr/>
               </a:pPr>
               <a:t>28</a:t>
+            </a:fld>
+            <a:endParaRPr lang="en-US"/>
+          </a:p>
+        </p:txBody>
+      </p:sp>
+      <p:sp>
+        <p:nvSpPr>
+          <p:cNvPr id="6" name="Text Placeholder 5"/>
+          <p:cNvSpPr>
+            <a:spLocks noGrp="1"/>
+          </p:cNvSpPr>
+          <p:nvPr>
+            <p:ph type="body" sz="quarter" idx="12"/>
+          </p:nvPr>
+        </p:nvSpPr>
+        <p:spPr/>
+        <p:txBody>
+          <a:bodyPr/>
+          <a:lstStyle/>
+          <a:p>
+            <a:r>
+              <a:rPr lang="en-US" dirty="0"/>
+              <a:t>Formula for confidence limits</a:t>
+            </a:r>
+          </a:p>
+        </p:txBody>
+      </p:sp>
+      <p:sp>
+        <p:nvSpPr>
+          <p:cNvPr id="9" name="Rectangle 8">
+            <a:extLst>
+              <a:ext uri="{FF2B5EF4-FFF2-40B4-BE49-F238E27FC236}">
+                <a16:creationId xmlns:a16="http://schemas.microsoft.com/office/drawing/2014/main" id="{A7DC106C-1FAA-40F2-A00E-58FBBFB0C539}"/>
+              </a:ext>
+            </a:extLst>
+          </p:cNvPr>
+          <p:cNvSpPr/>
+          <p:nvPr/>
+        </p:nvSpPr>
+        <p:spPr>
+          <a:xfrm>
+            <a:off x="457200" y="2514600"/>
+            <a:ext cx="8229600" cy="3139321"/>
+          </a:xfrm>
+          <a:prstGeom prst="rect">
+            <a:avLst/>
+          </a:prstGeom>
+        </p:spPr>
+        <p:txBody>
+          <a:bodyPr wrap="square">
+            <a:spAutoFit/>
+          </a:bodyPr>
+          <a:lstStyle/>
+          <a:p>
+            <a:r>
+              <a:rPr lang="en-US" dirty="0"/>
+              <a:t>Since the Kaplan-Meier curve is a product of conditional probabilities, you can, with relative ease, compute the variance on a log scale and then transform back to the original scale.</a:t>
+            </a:r>
+          </a:p>
+          <a:p>
+            <a:endParaRPr lang="en-US" dirty="0"/>
+          </a:p>
+          <a:p>
+            <a:endParaRPr lang="en-US" dirty="0"/>
+          </a:p>
+          <a:p>
+            <a:endParaRPr lang="en-US" dirty="0"/>
+          </a:p>
+          <a:p>
+            <a:endParaRPr lang="en-US" dirty="0"/>
+          </a:p>
+          <a:p>
+            <a:r>
+              <a:rPr lang="en-US" dirty="0"/>
+              <a:t>The full derivation requires knowledge of change of variable methods that you might have learned in your mathematical statistics class. Details are on pages 28-29 of Hosmer, </a:t>
+            </a:r>
+            <a:r>
+              <a:rPr lang="en-US" dirty="0" err="1"/>
+              <a:t>Lemeshow</a:t>
+            </a:r>
+            <a:r>
+              <a:rPr lang="en-US" dirty="0"/>
+              <a:t>, and May. There are other formulas for calculating confidence limits, but the limits based on the variance shown above works well in practice.</a:t>
+            </a:r>
+          </a:p>
+        </p:txBody>
+      </p:sp>
+      <p:pic>
+        <p:nvPicPr>
+          <p:cNvPr id="3" name="Picture 2">
+            <a:extLst>
+              <a:ext uri="{FF2B5EF4-FFF2-40B4-BE49-F238E27FC236}">
+                <a16:creationId xmlns:a16="http://schemas.microsoft.com/office/drawing/2014/main" id="{7511FA4E-228A-46F6-9E4A-7736453C73FB}"/>
+              </a:ext>
+            </a:extLst>
+          </p:cNvPr>
+          <p:cNvPicPr>
+            <a:picLocks noChangeAspect="1"/>
+          </p:cNvPicPr>
+          <p:nvPr/>
+        </p:nvPicPr>
+        <p:blipFill>
+          <a:blip r:embed="rId2"/>
+          <a:stretch>
+            <a:fillRect/>
+          </a:stretch>
+        </p:blipFill>
+        <p:spPr>
+          <a:xfrm>
+            <a:off x="457200" y="3733800"/>
+            <a:ext cx="2447925" cy="409575"/>
+          </a:xfrm>
+          <a:prstGeom prst="rect">
+            <a:avLst/>
+          </a:prstGeom>
+        </p:spPr>
+      </p:pic>
+    </p:spTree>
+    <p:extLst>
+      <p:ext uri="{BB962C8B-B14F-4D97-AF65-F5344CB8AC3E}">
+        <p14:creationId xmlns:p14="http://schemas.microsoft.com/office/powerpoint/2010/main" val="1226969316"/>
+      </p:ext>
+    </p:extLst>
+  </p:cSld>
+  <p:clrMapOvr>
+    <a:masterClrMapping/>
+  </p:clrMapOvr>
+</p:sld>
+</file>
+
+<file path=ppt/slides/slide29.xml><?xml version="1.0" encoding="utf-8"?>
+<p:sld xmlns:a="http://schemas.openxmlformats.org/drawingml/2006/main" xmlns:r="http://schemas.openxmlformats.org/officeDocument/2006/relationships" xmlns:p="http://schemas.openxmlformats.org/presentationml/2006/main">
+  <p:cSld>
+    <p:spTree>
+      <p:nvGrpSpPr>
+        <p:cNvPr id="1" name=""/>
+        <p:cNvGrpSpPr/>
+        <p:nvPr/>
+      </p:nvGrpSpPr>
+      <p:grpSpPr>
+        <a:xfrm>
+          <a:off x="0" y="0"/>
+          <a:ext cx="0" cy="0"/>
+          <a:chOff x="0" y="0"/>
+          <a:chExt cx="0" cy="0"/>
+        </a:xfrm>
+      </p:grpSpPr>
+      <p:sp>
+        <p:nvSpPr>
+          <p:cNvPr id="2" name="Title 1"/>
+          <p:cNvSpPr>
+            <a:spLocks noGrp="1"/>
+          </p:cNvSpPr>
+          <p:nvPr>
+            <p:ph type="title"/>
+          </p:nvPr>
+        </p:nvSpPr>
+        <p:spPr/>
+        <p:txBody>
+          <a:bodyPr/>
+          <a:lstStyle/>
+          <a:p>
+            <a:r>
+              <a:rPr lang="en-US" dirty="0"/>
+              <a:t>Kaplan-Meier curve for a larger data set</a:t>
+            </a:r>
+          </a:p>
+        </p:txBody>
+      </p:sp>
+      <p:sp>
+        <p:nvSpPr>
+          <p:cNvPr id="3" name="Text Placeholder 2"/>
+          <p:cNvSpPr>
+            <a:spLocks noGrp="1"/>
+          </p:cNvSpPr>
+          <p:nvPr>
+            <p:ph type="body" idx="1"/>
+          </p:nvPr>
+        </p:nvSpPr>
+        <p:spPr/>
+        <p:txBody>
+          <a:bodyPr/>
+          <a:lstStyle/>
+          <a:p>
+            <a:endParaRPr lang="en-US" dirty="0"/>
+          </a:p>
+        </p:txBody>
+      </p:sp>
+      <p:sp>
+        <p:nvSpPr>
+          <p:cNvPr id="4" name="Footer Placeholder 3"/>
+          <p:cNvSpPr>
+            <a:spLocks noGrp="1"/>
+          </p:cNvSpPr>
+          <p:nvPr>
+            <p:ph type="ftr" sz="quarter" idx="10"/>
+          </p:nvPr>
+        </p:nvSpPr>
+        <p:spPr/>
+        <p:txBody>
+          <a:bodyPr/>
+          <a:lstStyle/>
+          <a:p>
+            <a:pPr>
+              <a:defRPr/>
+            </a:pPr>
+            <a:r>
+              <a:rPr lang="en-US" altLang="en-US" dirty="0"/>
+              <a:t>©2016 </a:t>
+            </a:r>
+            <a:r>
+              <a:rPr lang="en-US" altLang="en-US"/>
+              <a:t>Steve Simon    </a:t>
+            </a:r>
+            <a:r>
+              <a:rPr lang="en-US" altLang="en-US" dirty="0"/>
+              <a:t>http://TheAnalysisFactor.com</a:t>
+            </a:r>
+          </a:p>
+        </p:txBody>
+      </p:sp>
+      <p:sp>
+        <p:nvSpPr>
+          <p:cNvPr id="5" name="Slide Number Placeholder 4"/>
+          <p:cNvSpPr>
+            <a:spLocks noGrp="1"/>
+          </p:cNvSpPr>
+          <p:nvPr>
+            <p:ph type="sldNum" sz="quarter" idx="11"/>
+          </p:nvPr>
+        </p:nvSpPr>
+        <p:spPr/>
+        <p:txBody>
+          <a:bodyPr/>
+          <a:lstStyle/>
+          <a:p>
+            <a:pPr>
+              <a:defRPr/>
+            </a:pPr>
+            <a:endParaRPr lang="en-US"/>
+          </a:p>
+          <a:p>
+            <a:pPr>
+              <a:defRPr/>
+            </a:pPr>
+            <a:fld id="{E9A8CBA3-AA2B-46A6-BFA3-DCEBEAAB3F0A}" type="slidenum">
+              <a:rPr lang="en-US" smtClean="0"/>
+              <a:pPr>
+                <a:defRPr/>
+              </a:pPr>
+              <a:t>29</a:t>
             </a:fld>
             <a:endParaRPr lang="en-US"/>
           </a:p>
@@ -8335,238 +8573,6 @@
 </p:sld>
 </file>
 
-<file path=ppt/slides/slide29.xml><?xml version="1.0" encoding="utf-8"?>
-<p:sld xmlns:a="http://schemas.openxmlformats.org/drawingml/2006/main" xmlns:r="http://schemas.openxmlformats.org/officeDocument/2006/relationships" xmlns:p="http://schemas.openxmlformats.org/presentationml/2006/main">
-  <p:cSld>
-    <p:spTree>
-      <p:nvGrpSpPr>
-        <p:cNvPr id="1" name=""/>
-        <p:cNvGrpSpPr/>
-        <p:nvPr/>
-      </p:nvGrpSpPr>
-      <p:grpSpPr>
-        <a:xfrm>
-          <a:off x="0" y="0"/>
-          <a:ext cx="0" cy="0"/>
-          <a:chOff x="0" y="0"/>
-          <a:chExt cx="0" cy="0"/>
-        </a:xfrm>
-      </p:grpSpPr>
-      <p:sp>
-        <p:nvSpPr>
-          <p:cNvPr id="2" name="Title 1"/>
-          <p:cNvSpPr>
-            <a:spLocks noGrp="1"/>
-          </p:cNvSpPr>
-          <p:nvPr>
-            <p:ph type="title"/>
-          </p:nvPr>
-        </p:nvSpPr>
-        <p:spPr/>
-        <p:txBody>
-          <a:bodyPr/>
-          <a:lstStyle/>
-          <a:p>
-            <a:r>
-              <a:rPr lang="en-US" dirty="0"/>
-              <a:t>Kaplan-Meier curve for a larger data set</a:t>
-            </a:r>
-          </a:p>
-        </p:txBody>
-      </p:sp>
-      <p:sp>
-        <p:nvSpPr>
-          <p:cNvPr id="4" name="Footer Placeholder 3"/>
-          <p:cNvSpPr>
-            <a:spLocks noGrp="1"/>
-          </p:cNvSpPr>
-          <p:nvPr>
-            <p:ph type="ftr" sz="quarter" idx="10"/>
-          </p:nvPr>
-        </p:nvSpPr>
-        <p:spPr/>
-        <p:txBody>
-          <a:bodyPr/>
-          <a:lstStyle/>
-          <a:p>
-            <a:pPr>
-              <a:defRPr/>
-            </a:pPr>
-            <a:r>
-              <a:rPr lang="en-US" altLang="en-US" dirty="0"/>
-              <a:t>©2016 </a:t>
-            </a:r>
-            <a:r>
-              <a:rPr lang="en-US" altLang="en-US"/>
-              <a:t>Steve Simon    </a:t>
-            </a:r>
-            <a:r>
-              <a:rPr lang="en-US" altLang="en-US" dirty="0"/>
-              <a:t>http://TheAnalysisFactor.com</a:t>
-            </a:r>
-          </a:p>
-        </p:txBody>
-      </p:sp>
-      <p:sp>
-        <p:nvSpPr>
-          <p:cNvPr id="5" name="Slide Number Placeholder 4"/>
-          <p:cNvSpPr>
-            <a:spLocks noGrp="1"/>
-          </p:cNvSpPr>
-          <p:nvPr>
-            <p:ph type="sldNum" sz="quarter" idx="11"/>
-          </p:nvPr>
-        </p:nvSpPr>
-        <p:spPr/>
-        <p:txBody>
-          <a:bodyPr/>
-          <a:lstStyle/>
-          <a:p>
-            <a:pPr>
-              <a:defRPr/>
-            </a:pPr>
-            <a:endParaRPr lang="en-US"/>
-          </a:p>
-          <a:p>
-            <a:pPr>
-              <a:defRPr/>
-            </a:pPr>
-            <a:fld id="{E9A8CBA3-AA2B-46A6-BFA3-DCEBEAAB3F0A}" type="slidenum">
-              <a:rPr lang="en-US" smtClean="0"/>
-              <a:pPr>
-                <a:defRPr/>
-              </a:pPr>
-              <a:t>29</a:t>
-            </a:fld>
-            <a:endParaRPr lang="en-US"/>
-          </a:p>
-        </p:txBody>
-      </p:sp>
-      <p:sp>
-        <p:nvSpPr>
-          <p:cNvPr id="6" name="Text Placeholder 5"/>
-          <p:cNvSpPr>
-            <a:spLocks noGrp="1"/>
-          </p:cNvSpPr>
-          <p:nvPr>
-            <p:ph type="body" sz="quarter" idx="12"/>
-          </p:nvPr>
-        </p:nvSpPr>
-        <p:spPr/>
-        <p:txBody>
-          <a:bodyPr/>
-          <a:lstStyle/>
-          <a:p>
-            <a:r>
-              <a:rPr lang="en-US" dirty="0"/>
-              <a:t>Formula for confidence limits</a:t>
-            </a:r>
-          </a:p>
-        </p:txBody>
-      </p:sp>
-      <p:sp>
-        <p:nvSpPr>
-          <p:cNvPr id="9" name="Rectangle 8">
-            <a:extLst>
-              <a:ext uri="{FF2B5EF4-FFF2-40B4-BE49-F238E27FC236}">
-                <a16:creationId xmlns:a16="http://schemas.microsoft.com/office/drawing/2014/main" id="{A7DC106C-1FAA-40F2-A00E-58FBBFB0C539}"/>
-              </a:ext>
-            </a:extLst>
-          </p:cNvPr>
-          <p:cNvSpPr/>
-          <p:nvPr/>
-        </p:nvSpPr>
-        <p:spPr>
-          <a:xfrm>
-            <a:off x="457200" y="2514600"/>
-            <a:ext cx="8229600" cy="3139321"/>
-          </a:xfrm>
-          <a:prstGeom prst="rect">
-            <a:avLst/>
-          </a:prstGeom>
-        </p:spPr>
-        <p:txBody>
-          <a:bodyPr wrap="square">
-            <a:spAutoFit/>
-          </a:bodyPr>
-          <a:lstStyle/>
-          <a:p>
-            <a:r>
-              <a:rPr lang="en-US" dirty="0"/>
-              <a:t>Since the Kaplan-Meier curve is a product of conditional probabilities, you can, with relative ease, compute the variance on a log scale and then transform back to the original scale.</a:t>
-            </a:r>
-          </a:p>
-          <a:p>
-            <a:endParaRPr lang="en-US" dirty="0"/>
-          </a:p>
-          <a:p>
-            <a:endParaRPr lang="en-US" dirty="0"/>
-          </a:p>
-          <a:p>
-            <a:endParaRPr lang="en-US" dirty="0"/>
-          </a:p>
-          <a:p>
-            <a:endParaRPr lang="en-US" dirty="0"/>
-          </a:p>
-          <a:p>
-            <a:r>
-              <a:rPr lang="en-US" dirty="0"/>
-              <a:t>The full derivation requires knowledge of change of variable methods that you might have learned in your mathematical statistics class. Details are on pages 28-29 of Hosmer, </a:t>
-            </a:r>
-            <a:r>
-              <a:rPr lang="en-US" dirty="0" err="1"/>
-              <a:t>Lemeshow</a:t>
-            </a:r>
-            <a:r>
-              <a:rPr lang="en-US" dirty="0"/>
-              <a:t>, and May. There are other formulas for calculating confidence limits, but the limits based on the variance shown above works well in practice.</a:t>
-            </a:r>
-          </a:p>
-        </p:txBody>
-      </p:sp>
-      <p:pic>
-        <p:nvPicPr>
-          <p:cNvPr id="3" name="Picture 2">
-            <a:extLst>
-              <a:ext uri="{FF2B5EF4-FFF2-40B4-BE49-F238E27FC236}">
-                <a16:creationId xmlns:a16="http://schemas.microsoft.com/office/drawing/2014/main" id="{7511FA4E-228A-46F6-9E4A-7736453C73FB}"/>
-              </a:ext>
-            </a:extLst>
-          </p:cNvPr>
-          <p:cNvPicPr>
-            <a:picLocks noChangeAspect="1"/>
-          </p:cNvPicPr>
-          <p:nvPr/>
-        </p:nvPicPr>
-        <p:blipFill>
-          <a:blip r:embed="rId2"/>
-          <a:stretch>
-            <a:fillRect/>
-          </a:stretch>
-        </p:blipFill>
-        <p:spPr>
-          <a:xfrm>
-            <a:off x="457200" y="3733800"/>
-            <a:ext cx="2447925" cy="409575"/>
-          </a:xfrm>
-          <a:prstGeom prst="rect">
-            <a:avLst/>
-          </a:prstGeom>
-        </p:spPr>
-      </p:pic>
-    </p:spTree>
-    <p:extLst>
-      <p:ext uri="{BB962C8B-B14F-4D97-AF65-F5344CB8AC3E}">
-        <p14:creationId xmlns:p14="http://schemas.microsoft.com/office/powerpoint/2010/main" val="1226969316"/>
-      </p:ext>
-    </p:extLst>
-  </p:cSld>
-  <p:clrMapOvr>
-    <a:masterClrMapping/>
-  </p:clrMapOvr>
-</p:sld>
-</file>
-
 <file path=ppt/slides/slide3.xml><?xml version="1.0" encoding="utf-8"?>
 <p:sld xmlns:a="http://schemas.openxmlformats.org/drawingml/2006/main" xmlns:r="http://schemas.openxmlformats.org/officeDocument/2006/relationships" xmlns:p="http://schemas.openxmlformats.org/presentationml/2006/main">
   <p:cSld>
@@ -8780,25 +8786,6 @@
       </p:sp>
       <p:sp>
         <p:nvSpPr>
-          <p:cNvPr id="3" name="Text Placeholder 2"/>
-          <p:cNvSpPr>
-            <a:spLocks noGrp="1"/>
-          </p:cNvSpPr>
-          <p:nvPr>
-            <p:ph type="body" idx="1"/>
-          </p:nvPr>
-        </p:nvSpPr>
-        <p:spPr/>
-        <p:txBody>
-          <a:bodyPr/>
-          <a:lstStyle/>
-          <a:p>
-            <a:endParaRPr lang="en-US" dirty="0"/>
-          </a:p>
-        </p:txBody>
-      </p:sp>
-      <p:sp>
-        <p:nvSpPr>
           <p:cNvPr id="4" name="Footer Placeholder 3"/>
           <p:cNvSpPr>
             <a:spLocks noGrp="1"/>
@@ -8860,6 +8847,210 @@
                 <a:defRPr/>
               </a:pPr>
               <a:t>30</a:t>
+            </a:fld>
+            <a:endParaRPr lang="en-US"/>
+          </a:p>
+        </p:txBody>
+      </p:sp>
+      <p:sp>
+        <p:nvSpPr>
+          <p:cNvPr id="6" name="Text Placeholder 5"/>
+          <p:cNvSpPr>
+            <a:spLocks noGrp="1"/>
+          </p:cNvSpPr>
+          <p:nvPr>
+            <p:ph type="body" sz="quarter" idx="12"/>
+          </p:nvPr>
+        </p:nvSpPr>
+        <p:spPr/>
+        <p:txBody>
+          <a:bodyPr/>
+          <a:lstStyle/>
+          <a:p>
+            <a:r>
+              <a:rPr lang="en-US" dirty="0"/>
+              <a:t>Quartile confidence limits</a:t>
+            </a:r>
+          </a:p>
+        </p:txBody>
+      </p:sp>
+      <p:sp>
+        <p:nvSpPr>
+          <p:cNvPr id="9" name="Rectangle 8">
+            <a:extLst>
+              <a:ext uri="{FF2B5EF4-FFF2-40B4-BE49-F238E27FC236}">
+                <a16:creationId xmlns:a16="http://schemas.microsoft.com/office/drawing/2014/main" id="{A7DC106C-1FAA-40F2-A00E-58FBBFB0C539}"/>
+              </a:ext>
+            </a:extLst>
+          </p:cNvPr>
+          <p:cNvSpPr/>
+          <p:nvPr/>
+        </p:nvSpPr>
+        <p:spPr>
+          <a:xfrm>
+            <a:off x="457200" y="2514600"/>
+            <a:ext cx="8229600" cy="1754326"/>
+          </a:xfrm>
+          <a:prstGeom prst="rect">
+            <a:avLst/>
+          </a:prstGeom>
+        </p:spPr>
+        <p:txBody>
+          <a:bodyPr wrap="square">
+            <a:spAutoFit/>
+          </a:bodyPr>
+          <a:lstStyle/>
+          <a:p>
+            <a:r>
+              <a:rPr lang="en-US" dirty="0"/>
+              <a:t>You can get confidence limits for the median survival time, the quartiles or any other survival percentile by extrapolating horizontally along the confidence limits of the Kaplan-Meier curve.</a:t>
+            </a:r>
+          </a:p>
+          <a:p>
+            <a:endParaRPr lang="en-US" dirty="0"/>
+          </a:p>
+          <a:p>
+            <a:r>
+              <a:rPr lang="en-US" dirty="0"/>
+              <a:t>For some percentiles, the horizontal line may not ever cross the upper confidence limit. In that case, you can set the upper confidence limit to plus infinity.</a:t>
+            </a:r>
+          </a:p>
+        </p:txBody>
+      </p:sp>
+    </p:spTree>
+    <p:extLst>
+      <p:ext uri="{BB962C8B-B14F-4D97-AF65-F5344CB8AC3E}">
+        <p14:creationId xmlns:p14="http://schemas.microsoft.com/office/powerpoint/2010/main" val="1427585360"/>
+      </p:ext>
+    </p:extLst>
+  </p:cSld>
+  <p:clrMapOvr>
+    <a:masterClrMapping/>
+  </p:clrMapOvr>
+</p:sld>
+</file>
+
+<file path=ppt/slides/slide31.xml><?xml version="1.0" encoding="utf-8"?>
+<p:sld xmlns:a="http://schemas.openxmlformats.org/drawingml/2006/main" xmlns:r="http://schemas.openxmlformats.org/officeDocument/2006/relationships" xmlns:p="http://schemas.openxmlformats.org/presentationml/2006/main">
+  <p:cSld>
+    <p:spTree>
+      <p:nvGrpSpPr>
+        <p:cNvPr id="1" name=""/>
+        <p:cNvGrpSpPr/>
+        <p:nvPr/>
+      </p:nvGrpSpPr>
+      <p:grpSpPr>
+        <a:xfrm>
+          <a:off x="0" y="0"/>
+          <a:ext cx="0" cy="0"/>
+          <a:chOff x="0" y="0"/>
+          <a:chExt cx="0" cy="0"/>
+        </a:xfrm>
+      </p:grpSpPr>
+      <p:sp>
+        <p:nvSpPr>
+          <p:cNvPr id="2" name="Title 1"/>
+          <p:cNvSpPr>
+            <a:spLocks noGrp="1"/>
+          </p:cNvSpPr>
+          <p:nvPr>
+            <p:ph type="title"/>
+          </p:nvPr>
+        </p:nvSpPr>
+        <p:spPr/>
+        <p:txBody>
+          <a:bodyPr/>
+          <a:lstStyle/>
+          <a:p>
+            <a:r>
+              <a:rPr lang="en-US" dirty="0"/>
+              <a:t>Kaplan-Meier curve for a larger data set</a:t>
+            </a:r>
+          </a:p>
+        </p:txBody>
+      </p:sp>
+      <p:sp>
+        <p:nvSpPr>
+          <p:cNvPr id="3" name="Text Placeholder 2"/>
+          <p:cNvSpPr>
+            <a:spLocks noGrp="1"/>
+          </p:cNvSpPr>
+          <p:nvPr>
+            <p:ph type="body" idx="1"/>
+          </p:nvPr>
+        </p:nvSpPr>
+        <p:spPr/>
+        <p:txBody>
+          <a:bodyPr/>
+          <a:lstStyle/>
+          <a:p>
+            <a:endParaRPr lang="en-US" dirty="0"/>
+          </a:p>
+        </p:txBody>
+      </p:sp>
+      <p:sp>
+        <p:nvSpPr>
+          <p:cNvPr id="4" name="Footer Placeholder 3"/>
+          <p:cNvSpPr>
+            <a:spLocks noGrp="1"/>
+          </p:cNvSpPr>
+          <p:nvPr>
+            <p:ph type="ftr" sz="quarter" idx="10"/>
+          </p:nvPr>
+        </p:nvSpPr>
+        <p:spPr/>
+        <p:txBody>
+          <a:bodyPr/>
+          <a:lstStyle/>
+          <a:p>
+            <a:pPr>
+              <a:defRPr/>
+            </a:pPr>
+            <a:r>
+              <a:rPr lang="en-US" altLang="en-US" dirty="0"/>
+              <a:t>©2016 </a:t>
+            </a:r>
+            <a:r>
+              <a:rPr lang="en-US" altLang="en-US"/>
+              <a:t>Steve Simon    </a:t>
+            </a:r>
+            <a:r>
+              <a:rPr lang="en-US" altLang="en-US" dirty="0"/>
+              <a:t>http://TheAnalysisFactor.com</a:t>
+            </a:r>
+          </a:p>
+        </p:txBody>
+      </p:sp>
+      <p:sp>
+        <p:nvSpPr>
+          <p:cNvPr id="5" name="Slide Number Placeholder 4"/>
+          <p:cNvSpPr>
+            <a:spLocks noGrp="1"/>
+          </p:cNvSpPr>
+          <p:nvPr>
+            <p:ph type="sldNum" sz="quarter" idx="11"/>
+          </p:nvPr>
+        </p:nvSpPr>
+        <p:spPr/>
+        <p:txBody>
+          <a:bodyPr/>
+          <a:lstStyle/>
+          <a:p>
+            <a:pPr>
+              <a:defRPr/>
+            </a:pPr>
+            <a:endParaRPr lang="en-US"/>
+          </a:p>
+          <a:p>
+            <a:pPr>
+              <a:defRPr/>
+            </a:pPr>
+            <a:fld id="{E9A8CBA3-AA2B-46A6-BFA3-DCEBEAAB3F0A}" type="slidenum">
+              <a:rPr lang="en-US" smtClean="0"/>
+              <a:pPr>
+                <a:defRPr/>
+              </a:pPr>
+              <a:t>31</a:t>
             </a:fld>
             <a:endParaRPr lang="en-US"/>
           </a:p>
@@ -8921,191 +9112,6 @@
     <p:extLst>
       <p:ext uri="{BB962C8B-B14F-4D97-AF65-F5344CB8AC3E}">
         <p14:creationId xmlns:p14="http://schemas.microsoft.com/office/powerpoint/2010/main" val="98727295"/>
-      </p:ext>
-    </p:extLst>
-  </p:cSld>
-  <p:clrMapOvr>
-    <a:masterClrMapping/>
-  </p:clrMapOvr>
-</p:sld>
-</file>
-
-<file path=ppt/slides/slide31.xml><?xml version="1.0" encoding="utf-8"?>
-<p:sld xmlns:a="http://schemas.openxmlformats.org/drawingml/2006/main" xmlns:r="http://schemas.openxmlformats.org/officeDocument/2006/relationships" xmlns:p="http://schemas.openxmlformats.org/presentationml/2006/main">
-  <p:cSld>
-    <p:spTree>
-      <p:nvGrpSpPr>
-        <p:cNvPr id="1" name=""/>
-        <p:cNvGrpSpPr/>
-        <p:nvPr/>
-      </p:nvGrpSpPr>
-      <p:grpSpPr>
-        <a:xfrm>
-          <a:off x="0" y="0"/>
-          <a:ext cx="0" cy="0"/>
-          <a:chOff x="0" y="0"/>
-          <a:chExt cx="0" cy="0"/>
-        </a:xfrm>
-      </p:grpSpPr>
-      <p:sp>
-        <p:nvSpPr>
-          <p:cNvPr id="2" name="Title 1"/>
-          <p:cNvSpPr>
-            <a:spLocks noGrp="1"/>
-          </p:cNvSpPr>
-          <p:nvPr>
-            <p:ph type="title"/>
-          </p:nvPr>
-        </p:nvSpPr>
-        <p:spPr/>
-        <p:txBody>
-          <a:bodyPr/>
-          <a:lstStyle/>
-          <a:p>
-            <a:r>
-              <a:rPr lang="en-US" dirty="0"/>
-              <a:t>Kaplan-Meier curve for a larger data set</a:t>
-            </a:r>
-          </a:p>
-        </p:txBody>
-      </p:sp>
-      <p:sp>
-        <p:nvSpPr>
-          <p:cNvPr id="4" name="Footer Placeholder 3"/>
-          <p:cNvSpPr>
-            <a:spLocks noGrp="1"/>
-          </p:cNvSpPr>
-          <p:nvPr>
-            <p:ph type="ftr" sz="quarter" idx="10"/>
-          </p:nvPr>
-        </p:nvSpPr>
-        <p:spPr/>
-        <p:txBody>
-          <a:bodyPr/>
-          <a:lstStyle/>
-          <a:p>
-            <a:pPr>
-              <a:defRPr/>
-            </a:pPr>
-            <a:r>
-              <a:rPr lang="en-US" altLang="en-US" dirty="0"/>
-              <a:t>©2016 </a:t>
-            </a:r>
-            <a:r>
-              <a:rPr lang="en-US" altLang="en-US"/>
-              <a:t>Steve Simon    </a:t>
-            </a:r>
-            <a:r>
-              <a:rPr lang="en-US" altLang="en-US" dirty="0"/>
-              <a:t>http://TheAnalysisFactor.com</a:t>
-            </a:r>
-          </a:p>
-        </p:txBody>
-      </p:sp>
-      <p:sp>
-        <p:nvSpPr>
-          <p:cNvPr id="5" name="Slide Number Placeholder 4"/>
-          <p:cNvSpPr>
-            <a:spLocks noGrp="1"/>
-          </p:cNvSpPr>
-          <p:nvPr>
-            <p:ph type="sldNum" sz="quarter" idx="11"/>
-          </p:nvPr>
-        </p:nvSpPr>
-        <p:spPr/>
-        <p:txBody>
-          <a:bodyPr/>
-          <a:lstStyle/>
-          <a:p>
-            <a:pPr>
-              <a:defRPr/>
-            </a:pPr>
-            <a:endParaRPr lang="en-US"/>
-          </a:p>
-          <a:p>
-            <a:pPr>
-              <a:defRPr/>
-            </a:pPr>
-            <a:fld id="{E9A8CBA3-AA2B-46A6-BFA3-DCEBEAAB3F0A}" type="slidenum">
-              <a:rPr lang="en-US" smtClean="0"/>
-              <a:pPr>
-                <a:defRPr/>
-              </a:pPr>
-              <a:t>31</a:t>
-            </a:fld>
-            <a:endParaRPr lang="en-US"/>
-          </a:p>
-        </p:txBody>
-      </p:sp>
-      <p:sp>
-        <p:nvSpPr>
-          <p:cNvPr id="6" name="Text Placeholder 5"/>
-          <p:cNvSpPr>
-            <a:spLocks noGrp="1"/>
-          </p:cNvSpPr>
-          <p:nvPr>
-            <p:ph type="body" sz="quarter" idx="12"/>
-          </p:nvPr>
-        </p:nvSpPr>
-        <p:spPr/>
-        <p:txBody>
-          <a:bodyPr/>
-          <a:lstStyle/>
-          <a:p>
-            <a:r>
-              <a:rPr lang="en-US" dirty="0"/>
-              <a:t>Quartile confidence limits</a:t>
-            </a:r>
-          </a:p>
-        </p:txBody>
-      </p:sp>
-      <p:sp>
-        <p:nvSpPr>
-          <p:cNvPr id="9" name="Rectangle 8">
-            <a:extLst>
-              <a:ext uri="{FF2B5EF4-FFF2-40B4-BE49-F238E27FC236}">
-                <a16:creationId xmlns:a16="http://schemas.microsoft.com/office/drawing/2014/main" id="{A7DC106C-1FAA-40F2-A00E-58FBBFB0C539}"/>
-              </a:ext>
-            </a:extLst>
-          </p:cNvPr>
-          <p:cNvSpPr/>
-          <p:nvPr/>
-        </p:nvSpPr>
-        <p:spPr>
-          <a:xfrm>
-            <a:off x="457200" y="2514600"/>
-            <a:ext cx="8229600" cy="1754326"/>
-          </a:xfrm>
-          <a:prstGeom prst="rect">
-            <a:avLst/>
-          </a:prstGeom>
-        </p:spPr>
-        <p:txBody>
-          <a:bodyPr wrap="square">
-            <a:spAutoFit/>
-          </a:bodyPr>
-          <a:lstStyle/>
-          <a:p>
-            <a:r>
-              <a:rPr lang="en-US" dirty="0"/>
-              <a:t>You can get confidence limits for the median survival time, the quartiles or any other survival percentile by extrapolating horizontally along the confidence limits of the Kaplan-Meier curve.</a:t>
-            </a:r>
-          </a:p>
-          <a:p>
-            <a:endParaRPr lang="en-US" dirty="0"/>
-          </a:p>
-          <a:p>
-            <a:r>
-              <a:rPr lang="en-US" dirty="0"/>
-              <a:t>For some percentiles, the horizontal line may not ever cross the upper confidence limit. In that case, you can set the upper confidence limit to plus infinity.</a:t>
-            </a:r>
-          </a:p>
-        </p:txBody>
-      </p:sp>
-    </p:spTree>
-    <p:extLst>
-      <p:ext uri="{BB962C8B-B14F-4D97-AF65-F5344CB8AC3E}">
-        <p14:creationId xmlns:p14="http://schemas.microsoft.com/office/powerpoint/2010/main" val="1427585360"/>
       </p:ext>
     </p:extLst>
   </p:cSld>
@@ -10859,49 +10865,51 @@
           <a:lstStyle/>
           <a:p>
             <a:r>
-              <a:rPr lang="en-US" dirty="0"/>
-              <a:t>The log rank test</a:t>
-            </a:r>
-          </a:p>
-          <a:p>
-            <a:pPr lvl="1"/>
-            <a:r>
-              <a:rPr lang="en-US" dirty="0"/>
-              <a:t> works well when you’re comparing a treatment group to a control group</a:t>
-            </a:r>
-          </a:p>
-          <a:p>
-            <a:pPr lvl="1"/>
-            <a:r>
-              <a:rPr lang="en-US" dirty="0"/>
-              <a:t>you can also use it when you have three or more groups.</a:t>
-            </a:r>
-          </a:p>
-          <a:p>
-            <a:r>
-              <a:rPr lang="en-US" dirty="0"/>
-              <a:t> But the log rank test does not extend beyond this:</a:t>
-            </a:r>
-          </a:p>
-          <a:p>
-            <a:pPr lvl="1"/>
-            <a:r>
-              <a:rPr lang="en-US" dirty="0"/>
-              <a:t>you cannot include a continuous predictor,</a:t>
-            </a:r>
-          </a:p>
-          <a:p>
-            <a:pPr lvl="1"/>
-            <a:r>
-              <a:rPr lang="en-US" dirty="0"/>
-              <a:t>you cannot analyze data with multiple predictors, and</a:t>
-            </a:r>
-          </a:p>
-          <a:p>
-            <a:pPr lvl="1"/>
-            <a:r>
-              <a:rPr lang="en-US" dirty="0"/>
-              <a:t>you cannot do risk adjustment.</a:t>
+              <a:rPr lang="en-US" sz="1600" dirty="0">
+                <a:latin typeface="Courier New" panose="02070309020205020404" pitchFamily="49" charset="0"/>
+                <a:cs typeface="Courier New" panose="02070309020205020404" pitchFamily="49" charset="0"/>
+              </a:rPr>
+              <a:t>                  N Observed Expected (O-E)^2/E (O-E)^2/V</a:t>
+            </a:r>
+          </a:p>
+          <a:p>
+            <a:r>
+              <a:rPr lang="en-US" sz="1600" dirty="0">
+                <a:latin typeface="Courier New" panose="02070309020205020404" pitchFamily="49" charset="0"/>
+                <a:cs typeface="Courier New" panose="02070309020205020404" pitchFamily="49" charset="0"/>
+              </a:rPr>
+              <a:t>whas100$gender=0 65       28     34.6      1.27      3.97</a:t>
+            </a:r>
+          </a:p>
+          <a:p>
+            <a:r>
+              <a:rPr lang="en-US" sz="1600" dirty="0">
+                <a:latin typeface="Courier New" panose="02070309020205020404" pitchFamily="49" charset="0"/>
+                <a:cs typeface="Courier New" panose="02070309020205020404" pitchFamily="49" charset="0"/>
+              </a:rPr>
+              <a:t>whas100$gender=1 35       23     16.4      2.68      3.97</a:t>
+            </a:r>
+          </a:p>
+          <a:p>
+            <a:endParaRPr lang="en-US" sz="1600" dirty="0">
+              <a:latin typeface="Courier New" panose="02070309020205020404" pitchFamily="49" charset="0"/>
+              <a:cs typeface="Courier New" panose="02070309020205020404" pitchFamily="49" charset="0"/>
+            </a:endParaRPr>
+          </a:p>
+          <a:p>
+            <a:r>
+              <a:rPr lang="en-US" sz="1600" dirty="0" err="1">
+                <a:latin typeface="Courier New" panose="02070309020205020404" pitchFamily="49" charset="0"/>
+                <a:cs typeface="Courier New" panose="02070309020205020404" pitchFamily="49" charset="0"/>
+              </a:rPr>
+              <a:t>Chisq</a:t>
+            </a:r>
+            <a:r>
+              <a:rPr lang="en-US" sz="1600" dirty="0">
+                <a:latin typeface="Courier New" panose="02070309020205020404" pitchFamily="49" charset="0"/>
+                <a:cs typeface="Courier New" panose="02070309020205020404" pitchFamily="49" charset="0"/>
+              </a:rPr>
+              <a:t>= 4  on 1 degrees of freedom, p= 0.0463</a:t>
             </a:r>
           </a:p>
         </p:txBody>
@@ -10991,7 +10999,7 @@
           <a:p>
             <a:r>
               <a:rPr lang="en-US" dirty="0"/>
-              <a:t>Limitations</a:t>
+              <a:t>Output from the WHAS100 data set</a:t>
             </a:r>
           </a:p>
         </p:txBody>
@@ -11178,6 +11186,1173 @@
     <p:extLst>
       <p:ext uri="{BB962C8B-B14F-4D97-AF65-F5344CB8AC3E}">
         <p14:creationId xmlns:p14="http://schemas.microsoft.com/office/powerpoint/2010/main" val="3945308824"/>
+      </p:ext>
+    </p:extLst>
+  </p:cSld>
+  <p:clrMapOvr>
+    <a:masterClrMapping/>
+  </p:clrMapOvr>
+</p:sld>
+</file>
+
+<file path=ppt/slides/slide40.xml><?xml version="1.0" encoding="utf-8"?>
+<p:sld xmlns:a="http://schemas.openxmlformats.org/drawingml/2006/main" xmlns:r="http://schemas.openxmlformats.org/officeDocument/2006/relationships" xmlns:p="http://schemas.openxmlformats.org/presentationml/2006/main">
+  <p:cSld>
+    <p:spTree>
+      <p:nvGrpSpPr>
+        <p:cNvPr id="1" name=""/>
+        <p:cNvGrpSpPr/>
+        <p:nvPr/>
+      </p:nvGrpSpPr>
+      <p:grpSpPr>
+        <a:xfrm>
+          <a:off x="0" y="0"/>
+          <a:ext cx="0" cy="0"/>
+          <a:chOff x="0" y="0"/>
+          <a:chExt cx="0" cy="0"/>
+        </a:xfrm>
+      </p:grpSpPr>
+      <p:sp>
+        <p:nvSpPr>
+          <p:cNvPr id="2" name="Title 1"/>
+          <p:cNvSpPr>
+            <a:spLocks noGrp="1"/>
+          </p:cNvSpPr>
+          <p:nvPr>
+            <p:ph type="title"/>
+          </p:nvPr>
+        </p:nvSpPr>
+        <p:spPr/>
+        <p:txBody>
+          <a:bodyPr/>
+          <a:lstStyle/>
+          <a:p>
+            <a:r>
+              <a:rPr lang="en-US" dirty="0"/>
+              <a:t>The log rank test</a:t>
+            </a:r>
+          </a:p>
+        </p:txBody>
+      </p:sp>
+      <p:sp>
+        <p:nvSpPr>
+          <p:cNvPr id="3" name="Text Placeholder 2"/>
+          <p:cNvSpPr>
+            <a:spLocks noGrp="1"/>
+          </p:cNvSpPr>
+          <p:nvPr>
+            <p:ph type="body" idx="1"/>
+          </p:nvPr>
+        </p:nvSpPr>
+        <p:spPr/>
+        <p:txBody>
+          <a:bodyPr/>
+          <a:lstStyle/>
+          <a:p>
+            <a:r>
+              <a:rPr lang="en-US" dirty="0"/>
+              <a:t>The log rank test cannot easily handle continuous predictor variables. For these variables, you should really consider a more sophisticated model like a Cox proportional hazards model (coming up in the next lecture). But you can get a rough preliminary idea of what is going on with a continuous predictor by categorizing it using one or more cut-points. Here’s an example using age.</a:t>
+            </a:r>
+          </a:p>
+        </p:txBody>
+      </p:sp>
+      <p:sp>
+        <p:nvSpPr>
+          <p:cNvPr id="4" name="Footer Placeholder 3"/>
+          <p:cNvSpPr>
+            <a:spLocks noGrp="1"/>
+          </p:cNvSpPr>
+          <p:nvPr>
+            <p:ph type="ftr" sz="quarter" idx="10"/>
+          </p:nvPr>
+        </p:nvSpPr>
+        <p:spPr/>
+        <p:txBody>
+          <a:bodyPr/>
+          <a:lstStyle/>
+          <a:p>
+            <a:pPr>
+              <a:defRPr/>
+            </a:pPr>
+            <a:r>
+              <a:rPr lang="en-US" altLang="en-US" dirty="0"/>
+              <a:t>©2016 </a:t>
+            </a:r>
+            <a:r>
+              <a:rPr lang="en-US" altLang="en-US"/>
+              <a:t>Steve Simon    </a:t>
+            </a:r>
+            <a:r>
+              <a:rPr lang="en-US" altLang="en-US" dirty="0"/>
+              <a:t>http://TheAnalysisFactor.com</a:t>
+            </a:r>
+          </a:p>
+        </p:txBody>
+      </p:sp>
+      <p:sp>
+        <p:nvSpPr>
+          <p:cNvPr id="5" name="Slide Number Placeholder 4"/>
+          <p:cNvSpPr>
+            <a:spLocks noGrp="1"/>
+          </p:cNvSpPr>
+          <p:nvPr>
+            <p:ph type="sldNum" sz="quarter" idx="11"/>
+          </p:nvPr>
+        </p:nvSpPr>
+        <p:spPr/>
+        <p:txBody>
+          <a:bodyPr/>
+          <a:lstStyle/>
+          <a:p>
+            <a:pPr>
+              <a:defRPr/>
+            </a:pPr>
+            <a:endParaRPr lang="en-US"/>
+          </a:p>
+          <a:p>
+            <a:pPr>
+              <a:defRPr/>
+            </a:pPr>
+            <a:fld id="{E9A8CBA3-AA2B-46A6-BFA3-DCEBEAAB3F0A}" type="slidenum">
+              <a:rPr lang="en-US" smtClean="0"/>
+              <a:pPr>
+                <a:defRPr/>
+              </a:pPr>
+              <a:t>40</a:t>
+            </a:fld>
+            <a:endParaRPr lang="en-US"/>
+          </a:p>
+        </p:txBody>
+      </p:sp>
+      <p:sp>
+        <p:nvSpPr>
+          <p:cNvPr id="6" name="Text Placeholder 5"/>
+          <p:cNvSpPr>
+            <a:spLocks noGrp="1"/>
+          </p:cNvSpPr>
+          <p:nvPr>
+            <p:ph type="body" sz="quarter" idx="12"/>
+          </p:nvPr>
+        </p:nvSpPr>
+        <p:spPr/>
+        <p:txBody>
+          <a:bodyPr/>
+          <a:lstStyle/>
+          <a:p>
+            <a:r>
+              <a:rPr lang="en-US" dirty="0"/>
+              <a:t>How to handle continuous outcomes	</a:t>
+            </a:r>
+          </a:p>
+        </p:txBody>
+      </p:sp>
+    </p:spTree>
+    <p:extLst>
+      <p:ext uri="{BB962C8B-B14F-4D97-AF65-F5344CB8AC3E}">
+        <p14:creationId xmlns:p14="http://schemas.microsoft.com/office/powerpoint/2010/main" val="1806432678"/>
+      </p:ext>
+    </p:extLst>
+  </p:cSld>
+  <p:clrMapOvr>
+    <a:masterClrMapping/>
+  </p:clrMapOvr>
+</p:sld>
+</file>
+
+<file path=ppt/slides/slide41.xml><?xml version="1.0" encoding="utf-8"?>
+<p:sld xmlns:a="http://schemas.openxmlformats.org/drawingml/2006/main" xmlns:r="http://schemas.openxmlformats.org/officeDocument/2006/relationships" xmlns:p="http://schemas.openxmlformats.org/presentationml/2006/main">
+  <p:cSld>
+    <p:spTree>
+      <p:nvGrpSpPr>
+        <p:cNvPr id="1" name=""/>
+        <p:cNvGrpSpPr/>
+        <p:nvPr/>
+      </p:nvGrpSpPr>
+      <p:grpSpPr>
+        <a:xfrm>
+          <a:off x="0" y="0"/>
+          <a:ext cx="0" cy="0"/>
+          <a:chOff x="0" y="0"/>
+          <a:chExt cx="0" cy="0"/>
+        </a:xfrm>
+      </p:grpSpPr>
+      <p:sp>
+        <p:nvSpPr>
+          <p:cNvPr id="2" name="Title 1"/>
+          <p:cNvSpPr>
+            <a:spLocks noGrp="1"/>
+          </p:cNvSpPr>
+          <p:nvPr>
+            <p:ph type="title"/>
+          </p:nvPr>
+        </p:nvSpPr>
+        <p:spPr/>
+        <p:txBody>
+          <a:bodyPr/>
+          <a:lstStyle/>
+          <a:p>
+            <a:r>
+              <a:rPr lang="en-US" dirty="0"/>
+              <a:t>The log rank test</a:t>
+            </a:r>
+          </a:p>
+        </p:txBody>
+      </p:sp>
+      <p:sp>
+        <p:nvSpPr>
+          <p:cNvPr id="3" name="Text Placeholder 2"/>
+          <p:cNvSpPr>
+            <a:spLocks noGrp="1"/>
+          </p:cNvSpPr>
+          <p:nvPr>
+            <p:ph type="body" idx="1"/>
+          </p:nvPr>
+        </p:nvSpPr>
+        <p:spPr/>
+        <p:txBody>
+          <a:bodyPr/>
+          <a:lstStyle/>
+          <a:p>
+            <a:r>
+              <a:rPr lang="en-US" dirty="0"/>
+              <a:t>Make sure that you have enough events in each age group.</a:t>
+            </a:r>
+          </a:p>
+          <a:p>
+            <a:endParaRPr lang="en-US" dirty="0"/>
+          </a:p>
+          <a:p>
+            <a:r>
+              <a:rPr lang="en-US" dirty="0">
+                <a:latin typeface="Courier New" panose="02070309020205020404" pitchFamily="49" charset="0"/>
+                <a:cs typeface="Courier New" panose="02070309020205020404" pitchFamily="49" charset="0"/>
+              </a:rPr>
+              <a:t>         0  1</a:t>
+            </a:r>
+          </a:p>
+          <a:p>
+            <a:r>
+              <a:rPr lang="en-US" dirty="0">
+                <a:latin typeface="Courier New" panose="02070309020205020404" pitchFamily="49" charset="0"/>
+                <a:cs typeface="Courier New" panose="02070309020205020404" pitchFamily="49" charset="0"/>
+              </a:rPr>
+              <a:t>  &lt;60   17  8</a:t>
+            </a:r>
+          </a:p>
+          <a:p>
+            <a:r>
+              <a:rPr lang="en-US" dirty="0">
+                <a:latin typeface="Courier New" panose="02070309020205020404" pitchFamily="49" charset="0"/>
+                <a:cs typeface="Courier New" panose="02070309020205020404" pitchFamily="49" charset="0"/>
+              </a:rPr>
+              <a:t>  60-69 16  7</a:t>
+            </a:r>
+          </a:p>
+          <a:p>
+            <a:r>
+              <a:rPr lang="en-US" dirty="0">
+                <a:latin typeface="Courier New" panose="02070309020205020404" pitchFamily="49" charset="0"/>
+                <a:cs typeface="Courier New" panose="02070309020205020404" pitchFamily="49" charset="0"/>
+              </a:rPr>
+              <a:t>  70-79  8 14</a:t>
+            </a:r>
+          </a:p>
+          <a:p>
+            <a:r>
+              <a:rPr lang="en-US" dirty="0">
+                <a:latin typeface="Courier New" panose="02070309020205020404" pitchFamily="49" charset="0"/>
+                <a:cs typeface="Courier New" panose="02070309020205020404" pitchFamily="49" charset="0"/>
+              </a:rPr>
+              <a:t>  &gt;=80   8 22</a:t>
+            </a:r>
+          </a:p>
+        </p:txBody>
+      </p:sp>
+      <p:sp>
+        <p:nvSpPr>
+          <p:cNvPr id="4" name="Footer Placeholder 3"/>
+          <p:cNvSpPr>
+            <a:spLocks noGrp="1"/>
+          </p:cNvSpPr>
+          <p:nvPr>
+            <p:ph type="ftr" sz="quarter" idx="10"/>
+          </p:nvPr>
+        </p:nvSpPr>
+        <p:spPr/>
+        <p:txBody>
+          <a:bodyPr/>
+          <a:lstStyle/>
+          <a:p>
+            <a:pPr>
+              <a:defRPr/>
+            </a:pPr>
+            <a:r>
+              <a:rPr lang="en-US" altLang="en-US" dirty="0"/>
+              <a:t>©2016 </a:t>
+            </a:r>
+            <a:r>
+              <a:rPr lang="en-US" altLang="en-US"/>
+              <a:t>Steve Simon    </a:t>
+            </a:r>
+            <a:r>
+              <a:rPr lang="en-US" altLang="en-US" dirty="0"/>
+              <a:t>http://TheAnalysisFactor.com</a:t>
+            </a:r>
+          </a:p>
+        </p:txBody>
+      </p:sp>
+      <p:sp>
+        <p:nvSpPr>
+          <p:cNvPr id="5" name="Slide Number Placeholder 4"/>
+          <p:cNvSpPr>
+            <a:spLocks noGrp="1"/>
+          </p:cNvSpPr>
+          <p:nvPr>
+            <p:ph type="sldNum" sz="quarter" idx="11"/>
+          </p:nvPr>
+        </p:nvSpPr>
+        <p:spPr/>
+        <p:txBody>
+          <a:bodyPr/>
+          <a:lstStyle/>
+          <a:p>
+            <a:pPr>
+              <a:defRPr/>
+            </a:pPr>
+            <a:endParaRPr lang="en-US"/>
+          </a:p>
+          <a:p>
+            <a:pPr>
+              <a:defRPr/>
+            </a:pPr>
+            <a:fld id="{E9A8CBA3-AA2B-46A6-BFA3-DCEBEAAB3F0A}" type="slidenum">
+              <a:rPr lang="en-US" smtClean="0"/>
+              <a:pPr>
+                <a:defRPr/>
+              </a:pPr>
+              <a:t>41</a:t>
+            </a:fld>
+            <a:endParaRPr lang="en-US"/>
+          </a:p>
+        </p:txBody>
+      </p:sp>
+      <p:sp>
+        <p:nvSpPr>
+          <p:cNvPr id="6" name="Text Placeholder 5"/>
+          <p:cNvSpPr>
+            <a:spLocks noGrp="1"/>
+          </p:cNvSpPr>
+          <p:nvPr>
+            <p:ph type="body" sz="quarter" idx="12"/>
+          </p:nvPr>
+        </p:nvSpPr>
+        <p:spPr/>
+        <p:txBody>
+          <a:bodyPr/>
+          <a:lstStyle/>
+          <a:p>
+            <a:r>
+              <a:rPr lang="en-US" dirty="0"/>
+              <a:t>How to handle continuous outcomes	</a:t>
+            </a:r>
+          </a:p>
+        </p:txBody>
+      </p:sp>
+    </p:spTree>
+    <p:extLst>
+      <p:ext uri="{BB962C8B-B14F-4D97-AF65-F5344CB8AC3E}">
+        <p14:creationId xmlns:p14="http://schemas.microsoft.com/office/powerpoint/2010/main" val="1117529986"/>
+      </p:ext>
+    </p:extLst>
+  </p:cSld>
+  <p:clrMapOvr>
+    <a:masterClrMapping/>
+  </p:clrMapOvr>
+</p:sld>
+</file>
+
+<file path=ppt/slides/slide42.xml><?xml version="1.0" encoding="utf-8"?>
+<p:sld xmlns:a="http://schemas.openxmlformats.org/drawingml/2006/main" xmlns:r="http://schemas.openxmlformats.org/officeDocument/2006/relationships" xmlns:p="http://schemas.openxmlformats.org/presentationml/2006/main">
+  <p:cSld>
+    <p:spTree>
+      <p:nvGrpSpPr>
+        <p:cNvPr id="1" name=""/>
+        <p:cNvGrpSpPr/>
+        <p:nvPr/>
+      </p:nvGrpSpPr>
+      <p:grpSpPr>
+        <a:xfrm>
+          <a:off x="0" y="0"/>
+          <a:ext cx="0" cy="0"/>
+          <a:chOff x="0" y="0"/>
+          <a:chExt cx="0" cy="0"/>
+        </a:xfrm>
+      </p:grpSpPr>
+      <p:sp>
+        <p:nvSpPr>
+          <p:cNvPr id="2" name="Title 1"/>
+          <p:cNvSpPr>
+            <a:spLocks noGrp="1"/>
+          </p:cNvSpPr>
+          <p:nvPr>
+            <p:ph type="title"/>
+          </p:nvPr>
+        </p:nvSpPr>
+        <p:spPr/>
+        <p:txBody>
+          <a:bodyPr/>
+          <a:lstStyle/>
+          <a:p>
+            <a:r>
+              <a:rPr lang="en-US" dirty="0"/>
+              <a:t>The log rank test</a:t>
+            </a:r>
+          </a:p>
+        </p:txBody>
+      </p:sp>
+      <p:sp>
+        <p:nvSpPr>
+          <p:cNvPr id="3" name="Text Placeholder 2"/>
+          <p:cNvSpPr>
+            <a:spLocks noGrp="1"/>
+          </p:cNvSpPr>
+          <p:nvPr>
+            <p:ph type="body" idx="1"/>
+          </p:nvPr>
+        </p:nvSpPr>
+        <p:spPr/>
+        <p:txBody>
+          <a:bodyPr/>
+          <a:lstStyle/>
+          <a:p>
+            <a:endParaRPr lang="en-US" dirty="0">
+              <a:latin typeface="Courier New" panose="02070309020205020404" pitchFamily="49" charset="0"/>
+              <a:cs typeface="Courier New" panose="02070309020205020404" pitchFamily="49" charset="0"/>
+            </a:endParaRPr>
+          </a:p>
+        </p:txBody>
+      </p:sp>
+      <p:sp>
+        <p:nvSpPr>
+          <p:cNvPr id="4" name="Footer Placeholder 3"/>
+          <p:cNvSpPr>
+            <a:spLocks noGrp="1"/>
+          </p:cNvSpPr>
+          <p:nvPr>
+            <p:ph type="ftr" sz="quarter" idx="10"/>
+          </p:nvPr>
+        </p:nvSpPr>
+        <p:spPr/>
+        <p:txBody>
+          <a:bodyPr/>
+          <a:lstStyle/>
+          <a:p>
+            <a:pPr>
+              <a:defRPr/>
+            </a:pPr>
+            <a:r>
+              <a:rPr lang="en-US" altLang="en-US" dirty="0"/>
+              <a:t>©2016 </a:t>
+            </a:r>
+            <a:r>
+              <a:rPr lang="en-US" altLang="en-US"/>
+              <a:t>Steve Simon    </a:t>
+            </a:r>
+            <a:r>
+              <a:rPr lang="en-US" altLang="en-US" dirty="0"/>
+              <a:t>http://TheAnalysisFactor.com</a:t>
+            </a:r>
+          </a:p>
+        </p:txBody>
+      </p:sp>
+      <p:sp>
+        <p:nvSpPr>
+          <p:cNvPr id="5" name="Slide Number Placeholder 4"/>
+          <p:cNvSpPr>
+            <a:spLocks noGrp="1"/>
+          </p:cNvSpPr>
+          <p:nvPr>
+            <p:ph type="sldNum" sz="quarter" idx="11"/>
+          </p:nvPr>
+        </p:nvSpPr>
+        <p:spPr/>
+        <p:txBody>
+          <a:bodyPr/>
+          <a:lstStyle/>
+          <a:p>
+            <a:pPr>
+              <a:defRPr/>
+            </a:pPr>
+            <a:endParaRPr lang="en-US"/>
+          </a:p>
+          <a:p>
+            <a:pPr>
+              <a:defRPr/>
+            </a:pPr>
+            <a:fld id="{E9A8CBA3-AA2B-46A6-BFA3-DCEBEAAB3F0A}" type="slidenum">
+              <a:rPr lang="en-US" smtClean="0"/>
+              <a:pPr>
+                <a:defRPr/>
+              </a:pPr>
+              <a:t>42</a:t>
+            </a:fld>
+            <a:endParaRPr lang="en-US"/>
+          </a:p>
+        </p:txBody>
+      </p:sp>
+      <p:sp>
+        <p:nvSpPr>
+          <p:cNvPr id="6" name="Text Placeholder 5"/>
+          <p:cNvSpPr>
+            <a:spLocks noGrp="1"/>
+          </p:cNvSpPr>
+          <p:nvPr>
+            <p:ph type="body" sz="quarter" idx="12"/>
+          </p:nvPr>
+        </p:nvSpPr>
+        <p:spPr/>
+        <p:txBody>
+          <a:bodyPr/>
+          <a:lstStyle/>
+          <a:p>
+            <a:r>
+              <a:rPr lang="en-US" dirty="0"/>
+              <a:t>How to handle continuous outcomes	</a:t>
+            </a:r>
+          </a:p>
+        </p:txBody>
+      </p:sp>
+      <p:pic>
+        <p:nvPicPr>
+          <p:cNvPr id="7" name="Picture 6">
+            <a:extLst>
+              <a:ext uri="{FF2B5EF4-FFF2-40B4-BE49-F238E27FC236}">
+                <a16:creationId xmlns:a16="http://schemas.microsoft.com/office/drawing/2014/main" id="{F1FC857B-FB43-4E66-BAFA-BB897B081CE0}"/>
+              </a:ext>
+            </a:extLst>
+          </p:cNvPr>
+          <p:cNvPicPr>
+            <a:picLocks noChangeAspect="1"/>
+          </p:cNvPicPr>
+          <p:nvPr/>
+        </p:nvPicPr>
+        <p:blipFill>
+          <a:blip r:embed="rId2"/>
+          <a:stretch>
+            <a:fillRect/>
+          </a:stretch>
+        </p:blipFill>
+        <p:spPr>
+          <a:xfrm>
+            <a:off x="457200" y="2361594"/>
+            <a:ext cx="8229600" cy="3657600"/>
+          </a:xfrm>
+          <a:prstGeom prst="rect">
+            <a:avLst/>
+          </a:prstGeom>
+        </p:spPr>
+      </p:pic>
+    </p:spTree>
+    <p:extLst>
+      <p:ext uri="{BB962C8B-B14F-4D97-AF65-F5344CB8AC3E}">
+        <p14:creationId xmlns:p14="http://schemas.microsoft.com/office/powerpoint/2010/main" val="2957418791"/>
+      </p:ext>
+    </p:extLst>
+  </p:cSld>
+  <p:clrMapOvr>
+    <a:masterClrMapping/>
+  </p:clrMapOvr>
+</p:sld>
+</file>
+
+<file path=ppt/slides/slide43.xml><?xml version="1.0" encoding="utf-8"?>
+<p:sld xmlns:a="http://schemas.openxmlformats.org/drawingml/2006/main" xmlns:r="http://schemas.openxmlformats.org/officeDocument/2006/relationships" xmlns:p="http://schemas.openxmlformats.org/presentationml/2006/main">
+  <p:cSld>
+    <p:spTree>
+      <p:nvGrpSpPr>
+        <p:cNvPr id="1" name=""/>
+        <p:cNvGrpSpPr/>
+        <p:nvPr/>
+      </p:nvGrpSpPr>
+      <p:grpSpPr>
+        <a:xfrm>
+          <a:off x="0" y="0"/>
+          <a:ext cx="0" cy="0"/>
+          <a:chOff x="0" y="0"/>
+          <a:chExt cx="0" cy="0"/>
+        </a:xfrm>
+      </p:grpSpPr>
+      <p:sp>
+        <p:nvSpPr>
+          <p:cNvPr id="2" name="Title 1"/>
+          <p:cNvSpPr>
+            <a:spLocks noGrp="1"/>
+          </p:cNvSpPr>
+          <p:nvPr>
+            <p:ph type="title"/>
+          </p:nvPr>
+        </p:nvSpPr>
+        <p:spPr/>
+        <p:txBody>
+          <a:bodyPr/>
+          <a:lstStyle/>
+          <a:p>
+            <a:r>
+              <a:rPr lang="en-US" dirty="0"/>
+              <a:t>The log rank test</a:t>
+            </a:r>
+          </a:p>
+        </p:txBody>
+      </p:sp>
+      <p:sp>
+        <p:nvSpPr>
+          <p:cNvPr id="3" name="Text Placeholder 2"/>
+          <p:cNvSpPr>
+            <a:spLocks noGrp="1"/>
+          </p:cNvSpPr>
+          <p:nvPr>
+            <p:ph type="body" idx="1"/>
+          </p:nvPr>
+        </p:nvSpPr>
+        <p:spPr/>
+        <p:txBody>
+          <a:bodyPr/>
+          <a:lstStyle/>
+          <a:p>
+            <a:r>
+              <a:rPr lang="en-US" sz="1600" dirty="0">
+                <a:latin typeface="Courier New" panose="02070309020205020404" pitchFamily="49" charset="0"/>
+                <a:cs typeface="Courier New" panose="02070309020205020404" pitchFamily="49" charset="0"/>
+              </a:rPr>
+              <a:t>                         N Observed Expected (O-E)^2/E (O-E)^2/V</a:t>
+            </a:r>
+          </a:p>
+          <a:p>
+            <a:r>
+              <a:rPr lang="en-US" sz="1600" dirty="0">
+                <a:latin typeface="Courier New" panose="02070309020205020404" pitchFamily="49" charset="0"/>
+                <a:cs typeface="Courier New" panose="02070309020205020404" pitchFamily="49" charset="0"/>
+              </a:rPr>
+              <a:t>whas100$age_group=&lt;60   25        8     15.5      3.64      5.29</a:t>
+            </a:r>
+          </a:p>
+          <a:p>
+            <a:r>
+              <a:rPr lang="en-US" sz="1600" dirty="0">
+                <a:latin typeface="Courier New" panose="02070309020205020404" pitchFamily="49" charset="0"/>
+                <a:cs typeface="Courier New" panose="02070309020205020404" pitchFamily="49" charset="0"/>
+              </a:rPr>
+              <a:t>whas100$age_group=60-69 23        7     12.9      2.71      3.68</a:t>
+            </a:r>
+          </a:p>
+          <a:p>
+            <a:r>
+              <a:rPr lang="en-US" sz="1600" dirty="0">
+                <a:latin typeface="Courier New" panose="02070309020205020404" pitchFamily="49" charset="0"/>
+                <a:cs typeface="Courier New" panose="02070309020205020404" pitchFamily="49" charset="0"/>
+              </a:rPr>
+              <a:t>whas100$age_group=70-79 22       14     10.2      1.39      1.76</a:t>
+            </a:r>
+          </a:p>
+          <a:p>
+            <a:r>
+              <a:rPr lang="en-US" sz="1600" dirty="0">
+                <a:latin typeface="Courier New" panose="02070309020205020404" pitchFamily="49" charset="0"/>
+                <a:cs typeface="Courier New" panose="02070309020205020404" pitchFamily="49" charset="0"/>
+              </a:rPr>
+              <a:t>whas100$age_group=&gt;=80  30       22     12.3      7.57     10.18</a:t>
+            </a:r>
+          </a:p>
+          <a:p>
+            <a:r>
+              <a:rPr lang="en-US" sz="1600" dirty="0">
+                <a:latin typeface="Courier New" panose="02070309020205020404" pitchFamily="49" charset="0"/>
+                <a:cs typeface="Courier New" panose="02070309020205020404" pitchFamily="49" charset="0"/>
+              </a:rPr>
+              <a:t> </a:t>
+            </a:r>
+          </a:p>
+          <a:p>
+            <a:r>
+              <a:rPr lang="en-US" sz="1600" dirty="0" err="1">
+                <a:latin typeface="Courier New" panose="02070309020205020404" pitchFamily="49" charset="0"/>
+                <a:cs typeface="Courier New" panose="02070309020205020404" pitchFamily="49" charset="0"/>
+              </a:rPr>
+              <a:t>Chisq</a:t>
+            </a:r>
+            <a:r>
+              <a:rPr lang="en-US" sz="1600" dirty="0">
+                <a:latin typeface="Courier New" panose="02070309020205020404" pitchFamily="49" charset="0"/>
+                <a:cs typeface="Courier New" panose="02070309020205020404" pitchFamily="49" charset="0"/>
+              </a:rPr>
+              <a:t>= 15.6  on 3 degrees of freedom, p= 0.00139</a:t>
+            </a:r>
+          </a:p>
+        </p:txBody>
+      </p:sp>
+      <p:sp>
+        <p:nvSpPr>
+          <p:cNvPr id="4" name="Footer Placeholder 3"/>
+          <p:cNvSpPr>
+            <a:spLocks noGrp="1"/>
+          </p:cNvSpPr>
+          <p:nvPr>
+            <p:ph type="ftr" sz="quarter" idx="10"/>
+          </p:nvPr>
+        </p:nvSpPr>
+        <p:spPr/>
+        <p:txBody>
+          <a:bodyPr/>
+          <a:lstStyle/>
+          <a:p>
+            <a:pPr>
+              <a:defRPr/>
+            </a:pPr>
+            <a:r>
+              <a:rPr lang="en-US" altLang="en-US" dirty="0"/>
+              <a:t>©2016 </a:t>
+            </a:r>
+            <a:r>
+              <a:rPr lang="en-US" altLang="en-US"/>
+              <a:t>Steve Simon    </a:t>
+            </a:r>
+            <a:r>
+              <a:rPr lang="en-US" altLang="en-US" dirty="0"/>
+              <a:t>http://TheAnalysisFactor.com</a:t>
+            </a:r>
+          </a:p>
+        </p:txBody>
+      </p:sp>
+      <p:sp>
+        <p:nvSpPr>
+          <p:cNvPr id="5" name="Slide Number Placeholder 4"/>
+          <p:cNvSpPr>
+            <a:spLocks noGrp="1"/>
+          </p:cNvSpPr>
+          <p:nvPr>
+            <p:ph type="sldNum" sz="quarter" idx="11"/>
+          </p:nvPr>
+        </p:nvSpPr>
+        <p:spPr/>
+        <p:txBody>
+          <a:bodyPr/>
+          <a:lstStyle/>
+          <a:p>
+            <a:pPr>
+              <a:defRPr/>
+            </a:pPr>
+            <a:endParaRPr lang="en-US"/>
+          </a:p>
+          <a:p>
+            <a:pPr>
+              <a:defRPr/>
+            </a:pPr>
+            <a:fld id="{E9A8CBA3-AA2B-46A6-BFA3-DCEBEAAB3F0A}" type="slidenum">
+              <a:rPr lang="en-US" smtClean="0"/>
+              <a:pPr>
+                <a:defRPr/>
+              </a:pPr>
+              <a:t>43</a:t>
+            </a:fld>
+            <a:endParaRPr lang="en-US"/>
+          </a:p>
+        </p:txBody>
+      </p:sp>
+      <p:sp>
+        <p:nvSpPr>
+          <p:cNvPr id="6" name="Text Placeholder 5"/>
+          <p:cNvSpPr>
+            <a:spLocks noGrp="1"/>
+          </p:cNvSpPr>
+          <p:nvPr>
+            <p:ph type="body" sz="quarter" idx="12"/>
+          </p:nvPr>
+        </p:nvSpPr>
+        <p:spPr/>
+        <p:txBody>
+          <a:bodyPr/>
+          <a:lstStyle/>
+          <a:p>
+            <a:r>
+              <a:rPr lang="en-US" dirty="0"/>
+              <a:t>How to handle continuous outcomes</a:t>
+            </a:r>
+          </a:p>
+        </p:txBody>
+      </p:sp>
+    </p:spTree>
+    <p:extLst>
+      <p:ext uri="{BB962C8B-B14F-4D97-AF65-F5344CB8AC3E}">
+        <p14:creationId xmlns:p14="http://schemas.microsoft.com/office/powerpoint/2010/main" val="3799264204"/>
+      </p:ext>
+    </p:extLst>
+  </p:cSld>
+  <p:clrMapOvr>
+    <a:masterClrMapping/>
+  </p:clrMapOvr>
+</p:sld>
+</file>
+
+<file path=ppt/slides/slide44.xml><?xml version="1.0" encoding="utf-8"?>
+<p:sld xmlns:a="http://schemas.openxmlformats.org/drawingml/2006/main" xmlns:r="http://schemas.openxmlformats.org/officeDocument/2006/relationships" xmlns:p="http://schemas.openxmlformats.org/presentationml/2006/main">
+  <p:cSld>
+    <p:spTree>
+      <p:nvGrpSpPr>
+        <p:cNvPr id="1" name=""/>
+        <p:cNvGrpSpPr/>
+        <p:nvPr/>
+      </p:nvGrpSpPr>
+      <p:grpSpPr>
+        <a:xfrm>
+          <a:off x="0" y="0"/>
+          <a:ext cx="0" cy="0"/>
+          <a:chOff x="0" y="0"/>
+          <a:chExt cx="0" cy="0"/>
+        </a:xfrm>
+      </p:grpSpPr>
+      <p:sp>
+        <p:nvSpPr>
+          <p:cNvPr id="2" name="Title 1"/>
+          <p:cNvSpPr>
+            <a:spLocks noGrp="1"/>
+          </p:cNvSpPr>
+          <p:nvPr>
+            <p:ph type="title"/>
+          </p:nvPr>
+        </p:nvSpPr>
+        <p:spPr/>
+        <p:txBody>
+          <a:bodyPr/>
+          <a:lstStyle/>
+          <a:p>
+            <a:r>
+              <a:rPr lang="en-US" dirty="0"/>
+              <a:t>The log rank test</a:t>
+            </a:r>
+          </a:p>
+        </p:txBody>
+      </p:sp>
+      <p:sp>
+        <p:nvSpPr>
+          <p:cNvPr id="3" name="Text Placeholder 2"/>
+          <p:cNvSpPr>
+            <a:spLocks noGrp="1"/>
+          </p:cNvSpPr>
+          <p:nvPr>
+            <p:ph type="body" idx="1"/>
+          </p:nvPr>
+        </p:nvSpPr>
+        <p:spPr/>
+        <p:txBody>
+          <a:bodyPr/>
+          <a:lstStyle/>
+          <a:p>
+            <a:r>
+              <a:rPr lang="en-US" dirty="0"/>
+              <a:t>The log rank test for more than two groups treats the groups in a nominal fashion—order is not important. For this particular data set, and many others, you might prefer a test for trend. This is available in most statistical packages, but we will not show the details here.</a:t>
+            </a:r>
+          </a:p>
+        </p:txBody>
+      </p:sp>
+      <p:sp>
+        <p:nvSpPr>
+          <p:cNvPr id="4" name="Footer Placeholder 3"/>
+          <p:cNvSpPr>
+            <a:spLocks noGrp="1"/>
+          </p:cNvSpPr>
+          <p:nvPr>
+            <p:ph type="ftr" sz="quarter" idx="10"/>
+          </p:nvPr>
+        </p:nvSpPr>
+        <p:spPr/>
+        <p:txBody>
+          <a:bodyPr/>
+          <a:lstStyle/>
+          <a:p>
+            <a:pPr>
+              <a:defRPr/>
+            </a:pPr>
+            <a:r>
+              <a:rPr lang="en-US" altLang="en-US" dirty="0"/>
+              <a:t>©2016 </a:t>
+            </a:r>
+            <a:r>
+              <a:rPr lang="en-US" altLang="en-US"/>
+              <a:t>Steve Simon    </a:t>
+            </a:r>
+            <a:r>
+              <a:rPr lang="en-US" altLang="en-US" dirty="0"/>
+              <a:t>http://TheAnalysisFactor.com</a:t>
+            </a:r>
+          </a:p>
+        </p:txBody>
+      </p:sp>
+      <p:sp>
+        <p:nvSpPr>
+          <p:cNvPr id="5" name="Slide Number Placeholder 4"/>
+          <p:cNvSpPr>
+            <a:spLocks noGrp="1"/>
+          </p:cNvSpPr>
+          <p:nvPr>
+            <p:ph type="sldNum" sz="quarter" idx="11"/>
+          </p:nvPr>
+        </p:nvSpPr>
+        <p:spPr/>
+        <p:txBody>
+          <a:bodyPr/>
+          <a:lstStyle/>
+          <a:p>
+            <a:pPr>
+              <a:defRPr/>
+            </a:pPr>
+            <a:endParaRPr lang="en-US"/>
+          </a:p>
+          <a:p>
+            <a:pPr>
+              <a:defRPr/>
+            </a:pPr>
+            <a:fld id="{E9A8CBA3-AA2B-46A6-BFA3-DCEBEAAB3F0A}" type="slidenum">
+              <a:rPr lang="en-US" smtClean="0"/>
+              <a:pPr>
+                <a:defRPr/>
+              </a:pPr>
+              <a:t>44</a:t>
+            </a:fld>
+            <a:endParaRPr lang="en-US"/>
+          </a:p>
+        </p:txBody>
+      </p:sp>
+      <p:sp>
+        <p:nvSpPr>
+          <p:cNvPr id="6" name="Text Placeholder 5"/>
+          <p:cNvSpPr>
+            <a:spLocks noGrp="1"/>
+          </p:cNvSpPr>
+          <p:nvPr>
+            <p:ph type="body" sz="quarter" idx="12"/>
+          </p:nvPr>
+        </p:nvSpPr>
+        <p:spPr/>
+        <p:txBody>
+          <a:bodyPr/>
+          <a:lstStyle/>
+          <a:p>
+            <a:r>
+              <a:rPr lang="en-US" dirty="0"/>
+              <a:t>Test for trend</a:t>
+            </a:r>
+          </a:p>
+        </p:txBody>
+      </p:sp>
+    </p:spTree>
+    <p:extLst>
+      <p:ext uri="{BB962C8B-B14F-4D97-AF65-F5344CB8AC3E}">
+        <p14:creationId xmlns:p14="http://schemas.microsoft.com/office/powerpoint/2010/main" val="4232911999"/>
+      </p:ext>
+    </p:extLst>
+  </p:cSld>
+  <p:clrMapOvr>
+    <a:masterClrMapping/>
+  </p:clrMapOvr>
+</p:sld>
+</file>
+
+<file path=ppt/slides/slide45.xml><?xml version="1.0" encoding="utf-8"?>
+<p:sld xmlns:a="http://schemas.openxmlformats.org/drawingml/2006/main" xmlns:r="http://schemas.openxmlformats.org/officeDocument/2006/relationships" xmlns:p="http://schemas.openxmlformats.org/presentationml/2006/main">
+  <p:cSld>
+    <p:spTree>
+      <p:nvGrpSpPr>
+        <p:cNvPr id="1" name=""/>
+        <p:cNvGrpSpPr/>
+        <p:nvPr/>
+      </p:nvGrpSpPr>
+      <p:grpSpPr>
+        <a:xfrm>
+          <a:off x="0" y="0"/>
+          <a:ext cx="0" cy="0"/>
+          <a:chOff x="0" y="0"/>
+          <a:chExt cx="0" cy="0"/>
+        </a:xfrm>
+      </p:grpSpPr>
+      <p:sp>
+        <p:nvSpPr>
+          <p:cNvPr id="2" name="Title 1"/>
+          <p:cNvSpPr>
+            <a:spLocks noGrp="1"/>
+          </p:cNvSpPr>
+          <p:nvPr>
+            <p:ph type="title"/>
+          </p:nvPr>
+        </p:nvSpPr>
+        <p:spPr/>
+        <p:txBody>
+          <a:bodyPr/>
+          <a:lstStyle/>
+          <a:p>
+            <a:r>
+              <a:rPr lang="en-US" dirty="0"/>
+              <a:t>The log rank test</a:t>
+            </a:r>
+          </a:p>
+        </p:txBody>
+      </p:sp>
+      <p:sp>
+        <p:nvSpPr>
+          <p:cNvPr id="3" name="Text Placeholder 2"/>
+          <p:cNvSpPr>
+            <a:spLocks noGrp="1"/>
+          </p:cNvSpPr>
+          <p:nvPr>
+            <p:ph type="body" idx="1"/>
+          </p:nvPr>
+        </p:nvSpPr>
+        <p:spPr/>
+        <p:txBody>
+          <a:bodyPr/>
+          <a:lstStyle/>
+          <a:p>
+            <a:r>
+              <a:rPr lang="en-US" dirty="0"/>
+              <a:t>The log rank test</a:t>
+            </a:r>
+          </a:p>
+          <a:p>
+            <a:pPr lvl="1"/>
+            <a:r>
+              <a:rPr lang="en-US" dirty="0"/>
+              <a:t> works well when you’re comparing a treatment group to a control group</a:t>
+            </a:r>
+          </a:p>
+          <a:p>
+            <a:pPr lvl="1"/>
+            <a:r>
+              <a:rPr lang="en-US" dirty="0"/>
+              <a:t>you can also use it when you have three or more groups.</a:t>
+            </a:r>
+          </a:p>
+          <a:p>
+            <a:r>
+              <a:rPr lang="en-US" dirty="0"/>
+              <a:t> But the log rank test does not extend beyond this:</a:t>
+            </a:r>
+          </a:p>
+          <a:p>
+            <a:pPr lvl="1"/>
+            <a:r>
+              <a:rPr lang="en-US" dirty="0"/>
+              <a:t>you cannot include a continuous predictor,</a:t>
+            </a:r>
+          </a:p>
+          <a:p>
+            <a:pPr lvl="1"/>
+            <a:r>
+              <a:rPr lang="en-US" dirty="0"/>
+              <a:t>you cannot analyze data with multiple predictors, and</a:t>
+            </a:r>
+          </a:p>
+          <a:p>
+            <a:pPr lvl="1"/>
+            <a:r>
+              <a:rPr lang="en-US" dirty="0"/>
+              <a:t>you cannot do risk adjustment.</a:t>
+            </a:r>
+          </a:p>
+        </p:txBody>
+      </p:sp>
+      <p:sp>
+        <p:nvSpPr>
+          <p:cNvPr id="4" name="Footer Placeholder 3"/>
+          <p:cNvSpPr>
+            <a:spLocks noGrp="1"/>
+          </p:cNvSpPr>
+          <p:nvPr>
+            <p:ph type="ftr" sz="quarter" idx="10"/>
+          </p:nvPr>
+        </p:nvSpPr>
+        <p:spPr/>
+        <p:txBody>
+          <a:bodyPr/>
+          <a:lstStyle/>
+          <a:p>
+            <a:pPr>
+              <a:defRPr/>
+            </a:pPr>
+            <a:r>
+              <a:rPr lang="en-US" altLang="en-US" dirty="0"/>
+              <a:t>©2016 </a:t>
+            </a:r>
+            <a:r>
+              <a:rPr lang="en-US" altLang="en-US"/>
+              <a:t>Steve Simon    </a:t>
+            </a:r>
+            <a:r>
+              <a:rPr lang="en-US" altLang="en-US" dirty="0"/>
+              <a:t>http://TheAnalysisFactor.com</a:t>
+            </a:r>
+          </a:p>
+        </p:txBody>
+      </p:sp>
+      <p:sp>
+        <p:nvSpPr>
+          <p:cNvPr id="5" name="Slide Number Placeholder 4"/>
+          <p:cNvSpPr>
+            <a:spLocks noGrp="1"/>
+          </p:cNvSpPr>
+          <p:nvPr>
+            <p:ph type="sldNum" sz="quarter" idx="11"/>
+          </p:nvPr>
+        </p:nvSpPr>
+        <p:spPr/>
+        <p:txBody>
+          <a:bodyPr/>
+          <a:lstStyle/>
+          <a:p>
+            <a:pPr>
+              <a:defRPr/>
+            </a:pPr>
+            <a:endParaRPr lang="en-US"/>
+          </a:p>
+          <a:p>
+            <a:pPr>
+              <a:defRPr/>
+            </a:pPr>
+            <a:fld id="{E9A8CBA3-AA2B-46A6-BFA3-DCEBEAAB3F0A}" type="slidenum">
+              <a:rPr lang="en-US" smtClean="0"/>
+              <a:pPr>
+                <a:defRPr/>
+              </a:pPr>
+              <a:t>45</a:t>
+            </a:fld>
+            <a:endParaRPr lang="en-US"/>
+          </a:p>
+        </p:txBody>
+      </p:sp>
+      <p:sp>
+        <p:nvSpPr>
+          <p:cNvPr id="6" name="Text Placeholder 5"/>
+          <p:cNvSpPr>
+            <a:spLocks noGrp="1"/>
+          </p:cNvSpPr>
+          <p:nvPr>
+            <p:ph type="body" sz="quarter" idx="12"/>
+          </p:nvPr>
+        </p:nvSpPr>
+        <p:spPr/>
+        <p:txBody>
+          <a:bodyPr/>
+          <a:lstStyle/>
+          <a:p>
+            <a:r>
+              <a:rPr lang="en-US" dirty="0"/>
+              <a:t>Limitations</a:t>
+            </a:r>
+          </a:p>
+        </p:txBody>
+      </p:sp>
+    </p:spTree>
+    <p:extLst>
+      <p:ext uri="{BB962C8B-B14F-4D97-AF65-F5344CB8AC3E}">
+        <p14:creationId xmlns:p14="http://schemas.microsoft.com/office/powerpoint/2010/main" val="221147034"/>
       </p:ext>
     </p:extLst>
   </p:cSld>

</xml_diff>